<commit_message>
Updatinmg presentation, adding in population calcs
</commit_message>
<xml_diff>
--- a/report/nofa_presentation-sadc.pptx
+++ b/report/nofa_presentation-sadc.pptx
@@ -22751,13 +22751,13 @@
         </p:spPr>
         <p:txBody>
           <a:bodyPr>
-            <a:normAutofit fontScale="77500" lnSpcReduction="20000"/>
+            <a:normAutofit fontScale="70000" lnSpcReduction="20000"/>
           </a:bodyPr>
           <a:lstStyle/>
           <a:p>
             <a:r>
               <a:rPr lang="en-GB" dirty="0" smtClean="0"/>
-              <a:t>In order to inform policy, the SAVAC has base its outcomes in terms of the poverty lines defined by Statistics South Africa in it’s Income-Expenditure Surveys. There are</a:t>
+              <a:t>In order to inform policy, the SAVAC has base its outcomes in terms of the poverty lines defined by Statistics South Africa’s Income-Expenditure Surveys. There are</a:t>
             </a:r>
           </a:p>
           <a:p>
@@ -22784,7 +22784,29 @@
           <a:p>
             <a:r>
               <a:rPr lang="en-GB" dirty="0" smtClean="0"/>
-              <a:t>This is to enable comparison’s of SAVAC forecasts with other survey data;</a:t>
+              <a:t>This is:</a:t>
+            </a:r>
+          </a:p>
+          <a:p>
+            <a:pPr lvl="1"/>
+            <a:r>
+              <a:rPr lang="en-GB" dirty="0" smtClean="0"/>
+              <a:t>To enable comparison’s of SAVAC forecasts with other survey data;</a:t>
+            </a:r>
+          </a:p>
+          <a:p>
+            <a:pPr lvl="1"/>
+            <a:r>
+              <a:rPr lang="en-GB" dirty="0" smtClean="0"/>
+              <a:t>To link the VA with the National Development Plan objectives – </a:t>
+            </a:r>
+            <a:r>
+              <a:rPr lang="en-GB" b="1" dirty="0" smtClean="0">
+                <a:solidFill>
+                  <a:srgbClr val="008000"/>
+                </a:solidFill>
+              </a:rPr>
+              <a:t>impact on policy</a:t>
             </a:r>
           </a:p>
           <a:p>
@@ -24074,25 +24096,1550 @@
           </a:p>
         </p:txBody>
       </p:sp>
-      <p:sp>
-        <p:nvSpPr>
-          <p:cNvPr id="3" name="Content Placeholder 2"/>
-          <p:cNvSpPr>
-            <a:spLocks noGrp="1"/>
-          </p:cNvSpPr>
+      <p:graphicFrame>
+        <p:nvGraphicFramePr>
+          <p:cNvPr id="4" name="Content Placeholder 3"/>
+          <p:cNvGraphicFramePr>
+            <a:graphicFrameLocks noGrp="1"/>
+          </p:cNvGraphicFramePr>
           <p:nvPr>
             <p:ph idx="1"/>
+            <p:extLst>
+              <p:ext uri="{D42A27DB-BD31-4B8C-83A1-F6EECF244321}">
+                <p14:modId xmlns:p14="http://schemas.microsoft.com/office/powerpoint/2010/main" val="3429198035"/>
+              </p:ext>
+            </p:extLst>
           </p:nvPr>
-        </p:nvSpPr>
-        <p:spPr/>
-        <p:txBody>
-          <a:bodyPr/>
-          <a:lstStyle/>
-          <a:p>
-            <a:endParaRPr lang="en-GB"/>
-          </a:p>
-        </p:txBody>
-      </p:sp>
+        </p:nvGraphicFramePr>
+        <p:xfrm>
+          <a:off x="1028700" y="1470815"/>
+          <a:ext cx="7061200" cy="4688684"/>
+        </p:xfrm>
+        <a:graphic>
+          <a:graphicData uri="http://schemas.openxmlformats.org/drawingml/2006/table">
+            <a:tbl>
+              <a:tblPr/>
+              <a:tblGrid>
+                <a:gridCol w="2045313"/>
+                <a:gridCol w="2654037"/>
+                <a:gridCol w="2361850"/>
+              </a:tblGrid>
+              <a:tr h="426244">
+                <a:tc>
+                  <a:txBody>
+                    <a:bodyPr/>
+                    <a:lstStyle/>
+                    <a:p>
+                      <a:pPr algn="l" fontAlgn="b"/>
+                      <a:r>
+                        <a:rPr lang="en-US" sz="2400" b="0" i="0" u="none" strike="noStrike">
+                          <a:solidFill>
+                            <a:srgbClr val="FFFFFF"/>
+                          </a:solidFill>
+                          <a:effectLst/>
+                          <a:latin typeface="Helvetica Neue Light"/>
+                        </a:rPr>
+                        <a:t>Row Labels</a:t>
+                      </a:r>
+                    </a:p>
+                  </a:txBody>
+                  <a:tcPr marL="12700" marR="12700" marT="12700" marB="0" anchor="b">
+                    <a:lnL>
+                      <a:noFill/>
+                    </a:lnL>
+                    <a:lnR>
+                      <a:noFill/>
+                    </a:lnR>
+                    <a:lnT w="6350" cap="flat" cmpd="sng" algn="ctr">
+                      <a:solidFill>
+                        <a:srgbClr val="76933C"/>
+                      </a:solidFill>
+                      <a:prstDash val="solid"/>
+                      <a:round/>
+                      <a:headEnd type="none" w="med" len="med"/>
+                      <a:tailEnd type="none" w="med" len="med"/>
+                    </a:lnT>
+                    <a:lnB w="6350" cap="flat" cmpd="sng" algn="ctr">
+                      <a:solidFill>
+                        <a:srgbClr val="EBF1DE"/>
+                      </a:solidFill>
+                      <a:prstDash val="solid"/>
+                      <a:round/>
+                      <a:headEnd type="none" w="med" len="med"/>
+                      <a:tailEnd type="none" w="med" len="med"/>
+                    </a:lnB>
+                    <a:solidFill>
+                      <a:srgbClr val="76933C"/>
+                    </a:solidFill>
+                  </a:tcPr>
+                </a:tc>
+                <a:tc>
+                  <a:txBody>
+                    <a:bodyPr/>
+                    <a:lstStyle/>
+                    <a:p>
+                      <a:pPr algn="r" fontAlgn="b"/>
+                      <a:r>
+                        <a:rPr lang="en-US" sz="2400" b="0" i="0" u="none" strike="noStrike" dirty="0" err="1" smtClean="0">
+                          <a:solidFill>
+                            <a:srgbClr val="FFFFFF"/>
+                          </a:solidFill>
+                          <a:effectLst/>
+                          <a:latin typeface="Helvetica Neue Light"/>
+                        </a:rPr>
+                        <a:t>pop_fpl_def</a:t>
+                      </a:r>
+                      <a:endParaRPr lang="en-US" sz="2400" b="0" i="0" u="none" strike="noStrike" dirty="0">
+                        <a:solidFill>
+                          <a:srgbClr val="FFFFFF"/>
+                        </a:solidFill>
+                        <a:effectLst/>
+                        <a:latin typeface="Helvetica Neue Light"/>
+                      </a:endParaRPr>
+                    </a:p>
+                  </a:txBody>
+                  <a:tcPr marL="12700" marR="12700" marT="12700" marB="0" anchor="b">
+                    <a:lnL>
+                      <a:noFill/>
+                    </a:lnL>
+                    <a:lnR>
+                      <a:noFill/>
+                    </a:lnR>
+                    <a:lnT w="6350" cap="flat" cmpd="sng" algn="ctr">
+                      <a:solidFill>
+                        <a:srgbClr val="76933C"/>
+                      </a:solidFill>
+                      <a:prstDash val="solid"/>
+                      <a:round/>
+                      <a:headEnd type="none" w="med" len="med"/>
+                      <a:tailEnd type="none" w="med" len="med"/>
+                    </a:lnT>
+                    <a:lnB w="6350" cap="flat" cmpd="sng" algn="ctr">
+                      <a:solidFill>
+                        <a:srgbClr val="EBF1DE"/>
+                      </a:solidFill>
+                      <a:prstDash val="solid"/>
+                      <a:round/>
+                      <a:headEnd type="none" w="med" len="med"/>
+                      <a:tailEnd type="none" w="med" len="med"/>
+                    </a:lnB>
+                    <a:solidFill>
+                      <a:srgbClr val="76933C"/>
+                    </a:solidFill>
+                  </a:tcPr>
+                </a:tc>
+                <a:tc>
+                  <a:txBody>
+                    <a:bodyPr/>
+                    <a:lstStyle/>
+                    <a:p>
+                      <a:pPr algn="r" fontAlgn="b"/>
+                      <a:r>
+                        <a:rPr lang="en-US" sz="2400" b="0" i="0" u="none" strike="noStrike" dirty="0" err="1" smtClean="0">
+                          <a:solidFill>
+                            <a:srgbClr val="FFFFFF"/>
+                          </a:solidFill>
+                          <a:effectLst/>
+                          <a:latin typeface="Helvetica Neue Light"/>
+                        </a:rPr>
+                        <a:t>fpl_deficit</a:t>
+                      </a:r>
+                      <a:endParaRPr lang="en-US" sz="2400" b="0" i="0" u="none" strike="noStrike" dirty="0">
+                        <a:solidFill>
+                          <a:srgbClr val="FFFFFF"/>
+                        </a:solidFill>
+                        <a:effectLst/>
+                        <a:latin typeface="Helvetica Neue Light"/>
+                      </a:endParaRPr>
+                    </a:p>
+                  </a:txBody>
+                  <a:tcPr marL="12700" marR="12700" marT="12700" marB="0" anchor="b">
+                    <a:lnL>
+                      <a:noFill/>
+                    </a:lnL>
+                    <a:lnR>
+                      <a:noFill/>
+                    </a:lnR>
+                    <a:lnT w="6350" cap="flat" cmpd="sng" algn="ctr">
+                      <a:solidFill>
+                        <a:srgbClr val="76933C"/>
+                      </a:solidFill>
+                      <a:prstDash val="solid"/>
+                      <a:round/>
+                      <a:headEnd type="none" w="med" len="med"/>
+                      <a:tailEnd type="none" w="med" len="med"/>
+                    </a:lnT>
+                    <a:lnB w="6350" cap="flat" cmpd="sng" algn="ctr">
+                      <a:solidFill>
+                        <a:srgbClr val="EBF1DE"/>
+                      </a:solidFill>
+                      <a:prstDash val="solid"/>
+                      <a:round/>
+                      <a:headEnd type="none" w="med" len="med"/>
+                      <a:tailEnd type="none" w="med" len="med"/>
+                    </a:lnB>
+                    <a:solidFill>
+                      <a:srgbClr val="76933C"/>
+                    </a:solidFill>
+                  </a:tcPr>
+                </a:tc>
+              </a:tr>
+              <a:tr h="426244">
+                <a:tc>
+                  <a:txBody>
+                    <a:bodyPr/>
+                    <a:lstStyle/>
+                    <a:p>
+                      <a:pPr algn="l" fontAlgn="b"/>
+                      <a:r>
+                        <a:rPr lang="en-US" sz="2400" b="0" i="0" u="none" strike="noStrike">
+                          <a:solidFill>
+                            <a:srgbClr val="000000"/>
+                          </a:solidFill>
+                          <a:effectLst/>
+                          <a:latin typeface="Helvetica Neue Light"/>
+                        </a:rPr>
+                        <a:t>Eastern Cape</a:t>
+                      </a:r>
+                    </a:p>
+                  </a:txBody>
+                  <a:tcPr marL="12700" marR="12700" marT="12700" marB="0" anchor="b">
+                    <a:lnL>
+                      <a:noFill/>
+                    </a:lnL>
+                    <a:lnR>
+                      <a:noFill/>
+                    </a:lnR>
+                    <a:lnT w="6350" cap="flat" cmpd="sng" algn="ctr">
+                      <a:solidFill>
+                        <a:srgbClr val="EBF1DE"/>
+                      </a:solidFill>
+                      <a:prstDash val="solid"/>
+                      <a:round/>
+                      <a:headEnd type="none" w="med" len="med"/>
+                      <a:tailEnd type="none" w="med" len="med"/>
+                    </a:lnT>
+                    <a:lnB w="6350" cap="flat" cmpd="sng" algn="ctr">
+                      <a:solidFill>
+                        <a:srgbClr val="EBF1DE"/>
+                      </a:solidFill>
+                      <a:prstDash val="solid"/>
+                      <a:round/>
+                      <a:headEnd type="none" w="med" len="med"/>
+                      <a:tailEnd type="none" w="med" len="med"/>
+                    </a:lnB>
+                  </a:tcPr>
+                </a:tc>
+                <a:tc>
+                  <a:txBody>
+                    <a:bodyPr/>
+                    <a:lstStyle/>
+                    <a:p>
+                      <a:pPr algn="r" fontAlgn="b"/>
+                      <a:r>
+                        <a:rPr lang="cs-CZ" sz="2400" b="0" i="0" u="none" strike="noStrike">
+                          <a:solidFill>
+                            <a:srgbClr val="000000"/>
+                          </a:solidFill>
+                          <a:effectLst/>
+                          <a:latin typeface="Helvetica Neue Light"/>
+                        </a:rPr>
+                        <a:t> 521,889 </a:t>
+                      </a:r>
+                    </a:p>
+                  </a:txBody>
+                  <a:tcPr marL="12700" marR="12700" marT="12700" marB="0" anchor="b">
+                    <a:lnL>
+                      <a:noFill/>
+                    </a:lnL>
+                    <a:lnR>
+                      <a:noFill/>
+                    </a:lnR>
+                    <a:lnT w="6350" cap="flat" cmpd="sng" algn="ctr">
+                      <a:solidFill>
+                        <a:srgbClr val="EBF1DE"/>
+                      </a:solidFill>
+                      <a:prstDash val="solid"/>
+                      <a:round/>
+                      <a:headEnd type="none" w="med" len="med"/>
+                      <a:tailEnd type="none" w="med" len="med"/>
+                    </a:lnT>
+                    <a:lnB w="6350" cap="flat" cmpd="sng" algn="ctr">
+                      <a:solidFill>
+                        <a:srgbClr val="EBF1DE"/>
+                      </a:solidFill>
+                      <a:prstDash val="solid"/>
+                      <a:round/>
+                      <a:headEnd type="none" w="med" len="med"/>
+                      <a:tailEnd type="none" w="med" len="med"/>
+                    </a:lnB>
+                  </a:tcPr>
+                </a:tc>
+                <a:tc>
+                  <a:txBody>
+                    <a:bodyPr/>
+                    <a:lstStyle/>
+                    <a:p>
+                      <a:pPr algn="r" fontAlgn="b"/>
+                      <a:r>
+                        <a:rPr lang="is-IS" sz="2400" b="0" i="0" u="none" strike="noStrike">
+                          <a:solidFill>
+                            <a:srgbClr val="000000"/>
+                          </a:solidFill>
+                          <a:effectLst/>
+                          <a:latin typeface="Helvetica Neue Light"/>
+                        </a:rPr>
+                        <a:t> 992,476,678 </a:t>
+                      </a:r>
+                    </a:p>
+                  </a:txBody>
+                  <a:tcPr marL="12700" marR="12700" marT="12700" marB="0" anchor="b">
+                    <a:lnL>
+                      <a:noFill/>
+                    </a:lnL>
+                    <a:lnR>
+                      <a:noFill/>
+                    </a:lnR>
+                    <a:lnT w="6350" cap="flat" cmpd="sng" algn="ctr">
+                      <a:solidFill>
+                        <a:srgbClr val="EBF1DE"/>
+                      </a:solidFill>
+                      <a:prstDash val="solid"/>
+                      <a:round/>
+                      <a:headEnd type="none" w="med" len="med"/>
+                      <a:tailEnd type="none" w="med" len="med"/>
+                    </a:lnT>
+                    <a:lnB w="6350" cap="flat" cmpd="sng" algn="ctr">
+                      <a:solidFill>
+                        <a:srgbClr val="EBF1DE"/>
+                      </a:solidFill>
+                      <a:prstDash val="solid"/>
+                      <a:round/>
+                      <a:headEnd type="none" w="med" len="med"/>
+                      <a:tailEnd type="none" w="med" len="med"/>
+                    </a:lnB>
+                  </a:tcPr>
+                </a:tc>
+              </a:tr>
+              <a:tr h="426244">
+                <a:tc>
+                  <a:txBody>
+                    <a:bodyPr/>
+                    <a:lstStyle/>
+                    <a:p>
+                      <a:pPr algn="l" fontAlgn="b"/>
+                      <a:r>
+                        <a:rPr lang="en-US" sz="2400" b="0" i="0" u="none" strike="noStrike">
+                          <a:solidFill>
+                            <a:srgbClr val="000000"/>
+                          </a:solidFill>
+                          <a:effectLst/>
+                          <a:latin typeface="Helvetica Neue Light"/>
+                        </a:rPr>
+                        <a:t>Free State</a:t>
+                      </a:r>
+                    </a:p>
+                  </a:txBody>
+                  <a:tcPr marL="12700" marR="12700" marT="12700" marB="0" anchor="b">
+                    <a:lnL>
+                      <a:noFill/>
+                    </a:lnL>
+                    <a:lnR>
+                      <a:noFill/>
+                    </a:lnR>
+                    <a:lnT w="6350" cap="flat" cmpd="sng" algn="ctr">
+                      <a:solidFill>
+                        <a:srgbClr val="EBF1DE"/>
+                      </a:solidFill>
+                      <a:prstDash val="solid"/>
+                      <a:round/>
+                      <a:headEnd type="none" w="med" len="med"/>
+                      <a:tailEnd type="none" w="med" len="med"/>
+                    </a:lnT>
+                    <a:lnB w="6350" cap="flat" cmpd="sng" algn="ctr">
+                      <a:solidFill>
+                        <a:srgbClr val="EBF1DE"/>
+                      </a:solidFill>
+                      <a:prstDash val="solid"/>
+                      <a:round/>
+                      <a:headEnd type="none" w="med" len="med"/>
+                      <a:tailEnd type="none" w="med" len="med"/>
+                    </a:lnB>
+                  </a:tcPr>
+                </a:tc>
+                <a:tc>
+                  <a:txBody>
+                    <a:bodyPr/>
+                    <a:lstStyle/>
+                    <a:p>
+                      <a:pPr algn="r" fontAlgn="b"/>
+                      <a:r>
+                        <a:rPr lang="is-IS" sz="2400" b="0" i="0" u="none" strike="noStrike">
+                          <a:solidFill>
+                            <a:srgbClr val="000000"/>
+                          </a:solidFill>
+                          <a:effectLst/>
+                          <a:latin typeface="Helvetica Neue Light"/>
+                        </a:rPr>
+                        <a:t> 68,318 </a:t>
+                      </a:r>
+                    </a:p>
+                  </a:txBody>
+                  <a:tcPr marL="12700" marR="12700" marT="12700" marB="0" anchor="b">
+                    <a:lnL>
+                      <a:noFill/>
+                    </a:lnL>
+                    <a:lnR>
+                      <a:noFill/>
+                    </a:lnR>
+                    <a:lnT w="6350" cap="flat" cmpd="sng" algn="ctr">
+                      <a:solidFill>
+                        <a:srgbClr val="EBF1DE"/>
+                      </a:solidFill>
+                      <a:prstDash val="solid"/>
+                      <a:round/>
+                      <a:headEnd type="none" w="med" len="med"/>
+                      <a:tailEnd type="none" w="med" len="med"/>
+                    </a:lnT>
+                    <a:lnB w="6350" cap="flat" cmpd="sng" algn="ctr">
+                      <a:solidFill>
+                        <a:srgbClr val="EBF1DE"/>
+                      </a:solidFill>
+                      <a:prstDash val="solid"/>
+                      <a:round/>
+                      <a:headEnd type="none" w="med" len="med"/>
+                      <a:tailEnd type="none" w="med" len="med"/>
+                    </a:lnB>
+                  </a:tcPr>
+                </a:tc>
+                <a:tc>
+                  <a:txBody>
+                    <a:bodyPr/>
+                    <a:lstStyle/>
+                    <a:p>
+                      <a:pPr algn="r" fontAlgn="b"/>
+                      <a:r>
+                        <a:rPr lang="is-IS" sz="2400" b="0" i="0" u="none" strike="noStrike">
+                          <a:solidFill>
+                            <a:srgbClr val="000000"/>
+                          </a:solidFill>
+                          <a:effectLst/>
+                          <a:latin typeface="Helvetica Neue Light"/>
+                        </a:rPr>
+                        <a:t> 107,568,303 </a:t>
+                      </a:r>
+                    </a:p>
+                  </a:txBody>
+                  <a:tcPr marL="12700" marR="12700" marT="12700" marB="0" anchor="b">
+                    <a:lnL>
+                      <a:noFill/>
+                    </a:lnL>
+                    <a:lnR>
+                      <a:noFill/>
+                    </a:lnR>
+                    <a:lnT w="6350" cap="flat" cmpd="sng" algn="ctr">
+                      <a:solidFill>
+                        <a:srgbClr val="EBF1DE"/>
+                      </a:solidFill>
+                      <a:prstDash val="solid"/>
+                      <a:round/>
+                      <a:headEnd type="none" w="med" len="med"/>
+                      <a:tailEnd type="none" w="med" len="med"/>
+                    </a:lnT>
+                    <a:lnB w="6350" cap="flat" cmpd="sng" algn="ctr">
+                      <a:solidFill>
+                        <a:srgbClr val="EBF1DE"/>
+                      </a:solidFill>
+                      <a:prstDash val="solid"/>
+                      <a:round/>
+                      <a:headEnd type="none" w="med" len="med"/>
+                      <a:tailEnd type="none" w="med" len="med"/>
+                    </a:lnB>
+                  </a:tcPr>
+                </a:tc>
+              </a:tr>
+              <a:tr h="426244">
+                <a:tc>
+                  <a:txBody>
+                    <a:bodyPr/>
+                    <a:lstStyle/>
+                    <a:p>
+                      <a:pPr algn="l" fontAlgn="b"/>
+                      <a:r>
+                        <a:rPr lang="en-US" sz="2400" b="0" i="0" u="none" strike="noStrike">
+                          <a:solidFill>
+                            <a:srgbClr val="000000"/>
+                          </a:solidFill>
+                          <a:effectLst/>
+                          <a:latin typeface="Helvetica Neue Light"/>
+                        </a:rPr>
+                        <a:t>Gauteng</a:t>
+                      </a:r>
+                    </a:p>
+                  </a:txBody>
+                  <a:tcPr marL="12700" marR="12700" marT="12700" marB="0" anchor="b">
+                    <a:lnL>
+                      <a:noFill/>
+                    </a:lnL>
+                    <a:lnR>
+                      <a:noFill/>
+                    </a:lnR>
+                    <a:lnT w="6350" cap="flat" cmpd="sng" algn="ctr">
+                      <a:solidFill>
+                        <a:srgbClr val="EBF1DE"/>
+                      </a:solidFill>
+                      <a:prstDash val="solid"/>
+                      <a:round/>
+                      <a:headEnd type="none" w="med" len="med"/>
+                      <a:tailEnd type="none" w="med" len="med"/>
+                    </a:lnT>
+                    <a:lnB w="6350" cap="flat" cmpd="sng" algn="ctr">
+                      <a:solidFill>
+                        <a:srgbClr val="EBF1DE"/>
+                      </a:solidFill>
+                      <a:prstDash val="solid"/>
+                      <a:round/>
+                      <a:headEnd type="none" w="med" len="med"/>
+                      <a:tailEnd type="none" w="med" len="med"/>
+                    </a:lnB>
+                  </a:tcPr>
+                </a:tc>
+                <a:tc>
+                  <a:txBody>
+                    <a:bodyPr/>
+                    <a:lstStyle/>
+                    <a:p>
+                      <a:pPr algn="r" fontAlgn="b"/>
+                      <a:r>
+                        <a:rPr lang="fi-FI" sz="2400" b="0" i="0" u="none" strike="noStrike">
+                          <a:solidFill>
+                            <a:srgbClr val="000000"/>
+                          </a:solidFill>
+                          <a:effectLst/>
+                          <a:latin typeface="Helvetica Neue Light"/>
+                        </a:rPr>
+                        <a:t> 18,136 </a:t>
+                      </a:r>
+                    </a:p>
+                  </a:txBody>
+                  <a:tcPr marL="12700" marR="12700" marT="12700" marB="0" anchor="b">
+                    <a:lnL>
+                      <a:noFill/>
+                    </a:lnL>
+                    <a:lnR>
+                      <a:noFill/>
+                    </a:lnR>
+                    <a:lnT w="6350" cap="flat" cmpd="sng" algn="ctr">
+                      <a:solidFill>
+                        <a:srgbClr val="EBF1DE"/>
+                      </a:solidFill>
+                      <a:prstDash val="solid"/>
+                      <a:round/>
+                      <a:headEnd type="none" w="med" len="med"/>
+                      <a:tailEnd type="none" w="med" len="med"/>
+                    </a:lnT>
+                    <a:lnB w="6350" cap="flat" cmpd="sng" algn="ctr">
+                      <a:solidFill>
+                        <a:srgbClr val="EBF1DE"/>
+                      </a:solidFill>
+                      <a:prstDash val="solid"/>
+                      <a:round/>
+                      <a:headEnd type="none" w="med" len="med"/>
+                      <a:tailEnd type="none" w="med" len="med"/>
+                    </a:lnB>
+                  </a:tcPr>
+                </a:tc>
+                <a:tc>
+                  <a:txBody>
+                    <a:bodyPr/>
+                    <a:lstStyle/>
+                    <a:p>
+                      <a:pPr algn="r" fontAlgn="b"/>
+                      <a:r>
+                        <a:rPr lang="fi-FI" sz="2400" b="0" i="0" u="none" strike="noStrike">
+                          <a:solidFill>
+                            <a:srgbClr val="000000"/>
+                          </a:solidFill>
+                          <a:effectLst/>
+                          <a:latin typeface="Helvetica Neue Light"/>
+                        </a:rPr>
+                        <a:t> 21,791,592 </a:t>
+                      </a:r>
+                    </a:p>
+                  </a:txBody>
+                  <a:tcPr marL="12700" marR="12700" marT="12700" marB="0" anchor="b">
+                    <a:lnL>
+                      <a:noFill/>
+                    </a:lnL>
+                    <a:lnR>
+                      <a:noFill/>
+                    </a:lnR>
+                    <a:lnT w="6350" cap="flat" cmpd="sng" algn="ctr">
+                      <a:solidFill>
+                        <a:srgbClr val="EBF1DE"/>
+                      </a:solidFill>
+                      <a:prstDash val="solid"/>
+                      <a:round/>
+                      <a:headEnd type="none" w="med" len="med"/>
+                      <a:tailEnd type="none" w="med" len="med"/>
+                    </a:lnT>
+                    <a:lnB w="6350" cap="flat" cmpd="sng" algn="ctr">
+                      <a:solidFill>
+                        <a:srgbClr val="EBF1DE"/>
+                      </a:solidFill>
+                      <a:prstDash val="solid"/>
+                      <a:round/>
+                      <a:headEnd type="none" w="med" len="med"/>
+                      <a:tailEnd type="none" w="med" len="med"/>
+                    </a:lnB>
+                  </a:tcPr>
+                </a:tc>
+              </a:tr>
+              <a:tr h="426244">
+                <a:tc>
+                  <a:txBody>
+                    <a:bodyPr/>
+                    <a:lstStyle/>
+                    <a:p>
+                      <a:pPr algn="l" fontAlgn="b"/>
+                      <a:r>
+                        <a:rPr lang="en-US" sz="2400" b="0" i="0" u="none" strike="noStrike">
+                          <a:solidFill>
+                            <a:srgbClr val="000000"/>
+                          </a:solidFill>
+                          <a:effectLst/>
+                          <a:latin typeface="Helvetica Neue Light"/>
+                        </a:rPr>
+                        <a:t>KwaZulu-Natal</a:t>
+                      </a:r>
+                    </a:p>
+                  </a:txBody>
+                  <a:tcPr marL="12700" marR="12700" marT="12700" marB="0" anchor="b">
+                    <a:lnL>
+                      <a:noFill/>
+                    </a:lnL>
+                    <a:lnR>
+                      <a:noFill/>
+                    </a:lnR>
+                    <a:lnT w="6350" cap="flat" cmpd="sng" algn="ctr">
+                      <a:solidFill>
+                        <a:srgbClr val="EBF1DE"/>
+                      </a:solidFill>
+                      <a:prstDash val="solid"/>
+                      <a:round/>
+                      <a:headEnd type="none" w="med" len="med"/>
+                      <a:tailEnd type="none" w="med" len="med"/>
+                    </a:lnT>
+                    <a:lnB w="6350" cap="flat" cmpd="sng" algn="ctr">
+                      <a:solidFill>
+                        <a:srgbClr val="EBF1DE"/>
+                      </a:solidFill>
+                      <a:prstDash val="solid"/>
+                      <a:round/>
+                      <a:headEnd type="none" w="med" len="med"/>
+                      <a:tailEnd type="none" w="med" len="med"/>
+                    </a:lnB>
+                  </a:tcPr>
+                </a:tc>
+                <a:tc>
+                  <a:txBody>
+                    <a:bodyPr/>
+                    <a:lstStyle/>
+                    <a:p>
+                      <a:pPr algn="r" fontAlgn="b"/>
+                      <a:r>
+                        <a:rPr lang="is-IS" sz="2400" b="0" i="0" u="none" strike="noStrike">
+                          <a:solidFill>
+                            <a:srgbClr val="000000"/>
+                          </a:solidFill>
+                          <a:effectLst/>
+                          <a:latin typeface="Helvetica Neue Light"/>
+                        </a:rPr>
+                        <a:t> 1,626,157 </a:t>
+                      </a:r>
+                    </a:p>
+                  </a:txBody>
+                  <a:tcPr marL="12700" marR="12700" marT="12700" marB="0" anchor="b">
+                    <a:lnL>
+                      <a:noFill/>
+                    </a:lnL>
+                    <a:lnR>
+                      <a:noFill/>
+                    </a:lnR>
+                    <a:lnT w="6350" cap="flat" cmpd="sng" algn="ctr">
+                      <a:solidFill>
+                        <a:srgbClr val="EBF1DE"/>
+                      </a:solidFill>
+                      <a:prstDash val="solid"/>
+                      <a:round/>
+                      <a:headEnd type="none" w="med" len="med"/>
+                      <a:tailEnd type="none" w="med" len="med"/>
+                    </a:lnT>
+                    <a:lnB w="6350" cap="flat" cmpd="sng" algn="ctr">
+                      <a:solidFill>
+                        <a:srgbClr val="EBF1DE"/>
+                      </a:solidFill>
+                      <a:prstDash val="solid"/>
+                      <a:round/>
+                      <a:headEnd type="none" w="med" len="med"/>
+                      <a:tailEnd type="none" w="med" len="med"/>
+                    </a:lnB>
+                  </a:tcPr>
+                </a:tc>
+                <a:tc>
+                  <a:txBody>
+                    <a:bodyPr/>
+                    <a:lstStyle/>
+                    <a:p>
+                      <a:pPr algn="r" fontAlgn="b"/>
+                      <a:r>
+                        <a:rPr lang="cs-CZ" sz="2400" b="0" i="0" u="none" strike="noStrike">
+                          <a:solidFill>
+                            <a:srgbClr val="000000"/>
+                          </a:solidFill>
+                          <a:effectLst/>
+                          <a:latin typeface="Helvetica Neue Light"/>
+                        </a:rPr>
+                        <a:t> 2,753,551,121 </a:t>
+                      </a:r>
+                    </a:p>
+                  </a:txBody>
+                  <a:tcPr marL="12700" marR="12700" marT="12700" marB="0" anchor="b">
+                    <a:lnL>
+                      <a:noFill/>
+                    </a:lnL>
+                    <a:lnR>
+                      <a:noFill/>
+                    </a:lnR>
+                    <a:lnT w="6350" cap="flat" cmpd="sng" algn="ctr">
+                      <a:solidFill>
+                        <a:srgbClr val="EBF1DE"/>
+                      </a:solidFill>
+                      <a:prstDash val="solid"/>
+                      <a:round/>
+                      <a:headEnd type="none" w="med" len="med"/>
+                      <a:tailEnd type="none" w="med" len="med"/>
+                    </a:lnT>
+                    <a:lnB w="6350" cap="flat" cmpd="sng" algn="ctr">
+                      <a:solidFill>
+                        <a:srgbClr val="EBF1DE"/>
+                      </a:solidFill>
+                      <a:prstDash val="solid"/>
+                      <a:round/>
+                      <a:headEnd type="none" w="med" len="med"/>
+                      <a:tailEnd type="none" w="med" len="med"/>
+                    </a:lnB>
+                  </a:tcPr>
+                </a:tc>
+              </a:tr>
+              <a:tr h="426244">
+                <a:tc>
+                  <a:txBody>
+                    <a:bodyPr/>
+                    <a:lstStyle/>
+                    <a:p>
+                      <a:pPr algn="l" fontAlgn="b"/>
+                      <a:r>
+                        <a:rPr lang="en-US" sz="2400" b="0" i="0" u="none" strike="noStrike">
+                          <a:solidFill>
+                            <a:srgbClr val="000000"/>
+                          </a:solidFill>
+                          <a:effectLst/>
+                          <a:latin typeface="Helvetica Neue Light"/>
+                        </a:rPr>
+                        <a:t>Limpopo</a:t>
+                      </a:r>
+                    </a:p>
+                  </a:txBody>
+                  <a:tcPr marL="12700" marR="12700" marT="12700" marB="0" anchor="b">
+                    <a:lnL>
+                      <a:noFill/>
+                    </a:lnL>
+                    <a:lnR>
+                      <a:noFill/>
+                    </a:lnR>
+                    <a:lnT w="6350" cap="flat" cmpd="sng" algn="ctr">
+                      <a:solidFill>
+                        <a:srgbClr val="EBF1DE"/>
+                      </a:solidFill>
+                      <a:prstDash val="solid"/>
+                      <a:round/>
+                      <a:headEnd type="none" w="med" len="med"/>
+                      <a:tailEnd type="none" w="med" len="med"/>
+                    </a:lnT>
+                    <a:lnB w="6350" cap="flat" cmpd="sng" algn="ctr">
+                      <a:solidFill>
+                        <a:srgbClr val="EBF1DE"/>
+                      </a:solidFill>
+                      <a:prstDash val="solid"/>
+                      <a:round/>
+                      <a:headEnd type="none" w="med" len="med"/>
+                      <a:tailEnd type="none" w="med" len="med"/>
+                    </a:lnB>
+                  </a:tcPr>
+                </a:tc>
+                <a:tc>
+                  <a:txBody>
+                    <a:bodyPr/>
+                    <a:lstStyle/>
+                    <a:p>
+                      <a:pPr algn="r" fontAlgn="b"/>
+                      <a:r>
+                        <a:rPr lang="fi-FI" sz="2400" b="0" i="0" u="none" strike="noStrike">
+                          <a:solidFill>
+                            <a:srgbClr val="000000"/>
+                          </a:solidFill>
+                          <a:effectLst/>
+                          <a:latin typeface="Helvetica Neue Light"/>
+                        </a:rPr>
+                        <a:t> 467,766 </a:t>
+                      </a:r>
+                    </a:p>
+                  </a:txBody>
+                  <a:tcPr marL="12700" marR="12700" marT="12700" marB="0" anchor="b">
+                    <a:lnL>
+                      <a:noFill/>
+                    </a:lnL>
+                    <a:lnR>
+                      <a:noFill/>
+                    </a:lnR>
+                    <a:lnT w="6350" cap="flat" cmpd="sng" algn="ctr">
+                      <a:solidFill>
+                        <a:srgbClr val="EBF1DE"/>
+                      </a:solidFill>
+                      <a:prstDash val="solid"/>
+                      <a:round/>
+                      <a:headEnd type="none" w="med" len="med"/>
+                      <a:tailEnd type="none" w="med" len="med"/>
+                    </a:lnT>
+                    <a:lnB w="6350" cap="flat" cmpd="sng" algn="ctr">
+                      <a:solidFill>
+                        <a:srgbClr val="EBF1DE"/>
+                      </a:solidFill>
+                      <a:prstDash val="solid"/>
+                      <a:round/>
+                      <a:headEnd type="none" w="med" len="med"/>
+                      <a:tailEnd type="none" w="med" len="med"/>
+                    </a:lnB>
+                  </a:tcPr>
+                </a:tc>
+                <a:tc>
+                  <a:txBody>
+                    <a:bodyPr/>
+                    <a:lstStyle/>
+                    <a:p>
+                      <a:pPr algn="r" fontAlgn="b"/>
+                      <a:r>
+                        <a:rPr lang="is-IS" sz="2400" b="0" i="0" u="none" strike="noStrike">
+                          <a:solidFill>
+                            <a:srgbClr val="000000"/>
+                          </a:solidFill>
+                          <a:effectLst/>
+                          <a:latin typeface="Helvetica Neue Light"/>
+                        </a:rPr>
+                        <a:t> 1,037,630,165 </a:t>
+                      </a:r>
+                    </a:p>
+                  </a:txBody>
+                  <a:tcPr marL="12700" marR="12700" marT="12700" marB="0" anchor="b">
+                    <a:lnL>
+                      <a:noFill/>
+                    </a:lnL>
+                    <a:lnR>
+                      <a:noFill/>
+                    </a:lnR>
+                    <a:lnT w="6350" cap="flat" cmpd="sng" algn="ctr">
+                      <a:solidFill>
+                        <a:srgbClr val="EBF1DE"/>
+                      </a:solidFill>
+                      <a:prstDash val="solid"/>
+                      <a:round/>
+                      <a:headEnd type="none" w="med" len="med"/>
+                      <a:tailEnd type="none" w="med" len="med"/>
+                    </a:lnT>
+                    <a:lnB w="6350" cap="flat" cmpd="sng" algn="ctr">
+                      <a:solidFill>
+                        <a:srgbClr val="EBF1DE"/>
+                      </a:solidFill>
+                      <a:prstDash val="solid"/>
+                      <a:round/>
+                      <a:headEnd type="none" w="med" len="med"/>
+                      <a:tailEnd type="none" w="med" len="med"/>
+                    </a:lnB>
+                  </a:tcPr>
+                </a:tc>
+              </a:tr>
+              <a:tr h="426244">
+                <a:tc>
+                  <a:txBody>
+                    <a:bodyPr/>
+                    <a:lstStyle/>
+                    <a:p>
+                      <a:pPr algn="l" fontAlgn="b"/>
+                      <a:r>
+                        <a:rPr lang="en-US" sz="2400" b="0" i="0" u="none" strike="noStrike">
+                          <a:solidFill>
+                            <a:srgbClr val="000000"/>
+                          </a:solidFill>
+                          <a:effectLst/>
+                          <a:latin typeface="Helvetica Neue Light"/>
+                        </a:rPr>
+                        <a:t>Mpumalanga</a:t>
+                      </a:r>
+                    </a:p>
+                  </a:txBody>
+                  <a:tcPr marL="12700" marR="12700" marT="12700" marB="0" anchor="b">
+                    <a:lnL>
+                      <a:noFill/>
+                    </a:lnL>
+                    <a:lnR>
+                      <a:noFill/>
+                    </a:lnR>
+                    <a:lnT w="6350" cap="flat" cmpd="sng" algn="ctr">
+                      <a:solidFill>
+                        <a:srgbClr val="EBF1DE"/>
+                      </a:solidFill>
+                      <a:prstDash val="solid"/>
+                      <a:round/>
+                      <a:headEnd type="none" w="med" len="med"/>
+                      <a:tailEnd type="none" w="med" len="med"/>
+                    </a:lnT>
+                    <a:lnB w="6350" cap="flat" cmpd="sng" algn="ctr">
+                      <a:solidFill>
+                        <a:srgbClr val="EBF1DE"/>
+                      </a:solidFill>
+                      <a:prstDash val="solid"/>
+                      <a:round/>
+                      <a:headEnd type="none" w="med" len="med"/>
+                      <a:tailEnd type="none" w="med" len="med"/>
+                    </a:lnB>
+                  </a:tcPr>
+                </a:tc>
+                <a:tc>
+                  <a:txBody>
+                    <a:bodyPr/>
+                    <a:lstStyle/>
+                    <a:p>
+                      <a:pPr algn="r" fontAlgn="b"/>
+                      <a:r>
+                        <a:rPr lang="is-IS" sz="2400" b="0" i="0" u="none" strike="noStrike">
+                          <a:solidFill>
+                            <a:srgbClr val="000000"/>
+                          </a:solidFill>
+                          <a:effectLst/>
+                          <a:latin typeface="Helvetica Neue Light"/>
+                        </a:rPr>
+                        <a:t> 314,481 </a:t>
+                      </a:r>
+                    </a:p>
+                  </a:txBody>
+                  <a:tcPr marL="12700" marR="12700" marT="12700" marB="0" anchor="b">
+                    <a:lnL>
+                      <a:noFill/>
+                    </a:lnL>
+                    <a:lnR>
+                      <a:noFill/>
+                    </a:lnR>
+                    <a:lnT w="6350" cap="flat" cmpd="sng" algn="ctr">
+                      <a:solidFill>
+                        <a:srgbClr val="EBF1DE"/>
+                      </a:solidFill>
+                      <a:prstDash val="solid"/>
+                      <a:round/>
+                      <a:headEnd type="none" w="med" len="med"/>
+                      <a:tailEnd type="none" w="med" len="med"/>
+                    </a:lnT>
+                    <a:lnB w="6350" cap="flat" cmpd="sng" algn="ctr">
+                      <a:solidFill>
+                        <a:srgbClr val="EBF1DE"/>
+                      </a:solidFill>
+                      <a:prstDash val="solid"/>
+                      <a:round/>
+                      <a:headEnd type="none" w="med" len="med"/>
+                      <a:tailEnd type="none" w="med" len="med"/>
+                    </a:lnB>
+                  </a:tcPr>
+                </a:tc>
+                <a:tc>
+                  <a:txBody>
+                    <a:bodyPr/>
+                    <a:lstStyle/>
+                    <a:p>
+                      <a:pPr algn="r" fontAlgn="b"/>
+                      <a:r>
+                        <a:rPr lang="is-IS" sz="2400" b="0" i="0" u="none" strike="noStrike">
+                          <a:solidFill>
+                            <a:srgbClr val="000000"/>
+                          </a:solidFill>
+                          <a:effectLst/>
+                          <a:latin typeface="Helvetica Neue Light"/>
+                        </a:rPr>
+                        <a:t> 618,120,122 </a:t>
+                      </a:r>
+                    </a:p>
+                  </a:txBody>
+                  <a:tcPr marL="12700" marR="12700" marT="12700" marB="0" anchor="b">
+                    <a:lnL>
+                      <a:noFill/>
+                    </a:lnL>
+                    <a:lnR>
+                      <a:noFill/>
+                    </a:lnR>
+                    <a:lnT w="6350" cap="flat" cmpd="sng" algn="ctr">
+                      <a:solidFill>
+                        <a:srgbClr val="EBF1DE"/>
+                      </a:solidFill>
+                      <a:prstDash val="solid"/>
+                      <a:round/>
+                      <a:headEnd type="none" w="med" len="med"/>
+                      <a:tailEnd type="none" w="med" len="med"/>
+                    </a:lnT>
+                    <a:lnB w="6350" cap="flat" cmpd="sng" algn="ctr">
+                      <a:solidFill>
+                        <a:srgbClr val="EBF1DE"/>
+                      </a:solidFill>
+                      <a:prstDash val="solid"/>
+                      <a:round/>
+                      <a:headEnd type="none" w="med" len="med"/>
+                      <a:tailEnd type="none" w="med" len="med"/>
+                    </a:lnB>
+                  </a:tcPr>
+                </a:tc>
+              </a:tr>
+              <a:tr h="426244">
+                <a:tc>
+                  <a:txBody>
+                    <a:bodyPr/>
+                    <a:lstStyle/>
+                    <a:p>
+                      <a:pPr algn="l" fontAlgn="b"/>
+                      <a:r>
+                        <a:rPr lang="en-US" sz="2400" b="0" i="0" u="none" strike="noStrike">
+                          <a:solidFill>
+                            <a:srgbClr val="000000"/>
+                          </a:solidFill>
+                          <a:effectLst/>
+                          <a:latin typeface="Helvetica Neue Light"/>
+                        </a:rPr>
+                        <a:t>North West</a:t>
+                      </a:r>
+                    </a:p>
+                  </a:txBody>
+                  <a:tcPr marL="12700" marR="12700" marT="12700" marB="0" anchor="b">
+                    <a:lnL>
+                      <a:noFill/>
+                    </a:lnL>
+                    <a:lnR>
+                      <a:noFill/>
+                    </a:lnR>
+                    <a:lnT w="6350" cap="flat" cmpd="sng" algn="ctr">
+                      <a:solidFill>
+                        <a:srgbClr val="EBF1DE"/>
+                      </a:solidFill>
+                      <a:prstDash val="solid"/>
+                      <a:round/>
+                      <a:headEnd type="none" w="med" len="med"/>
+                      <a:tailEnd type="none" w="med" len="med"/>
+                    </a:lnT>
+                    <a:lnB w="6350" cap="flat" cmpd="sng" algn="ctr">
+                      <a:solidFill>
+                        <a:srgbClr val="EBF1DE"/>
+                      </a:solidFill>
+                      <a:prstDash val="solid"/>
+                      <a:round/>
+                      <a:headEnd type="none" w="med" len="med"/>
+                      <a:tailEnd type="none" w="med" len="med"/>
+                    </a:lnB>
+                  </a:tcPr>
+                </a:tc>
+                <a:tc>
+                  <a:txBody>
+                    <a:bodyPr/>
+                    <a:lstStyle/>
+                    <a:p>
+                      <a:pPr algn="r" fontAlgn="b"/>
+                      <a:r>
+                        <a:rPr lang="is-IS" sz="2400" b="0" i="0" u="none" strike="noStrike">
+                          <a:solidFill>
+                            <a:srgbClr val="000000"/>
+                          </a:solidFill>
+                          <a:effectLst/>
+                          <a:latin typeface="Helvetica Neue Light"/>
+                        </a:rPr>
+                        <a:t> 291,624 </a:t>
+                      </a:r>
+                    </a:p>
+                  </a:txBody>
+                  <a:tcPr marL="12700" marR="12700" marT="12700" marB="0" anchor="b">
+                    <a:lnL>
+                      <a:noFill/>
+                    </a:lnL>
+                    <a:lnR>
+                      <a:noFill/>
+                    </a:lnR>
+                    <a:lnT w="6350" cap="flat" cmpd="sng" algn="ctr">
+                      <a:solidFill>
+                        <a:srgbClr val="EBF1DE"/>
+                      </a:solidFill>
+                      <a:prstDash val="solid"/>
+                      <a:round/>
+                      <a:headEnd type="none" w="med" len="med"/>
+                      <a:tailEnd type="none" w="med" len="med"/>
+                    </a:lnT>
+                    <a:lnB w="6350" cap="flat" cmpd="sng" algn="ctr">
+                      <a:solidFill>
+                        <a:srgbClr val="EBF1DE"/>
+                      </a:solidFill>
+                      <a:prstDash val="solid"/>
+                      <a:round/>
+                      <a:headEnd type="none" w="med" len="med"/>
+                      <a:tailEnd type="none" w="med" len="med"/>
+                    </a:lnB>
+                  </a:tcPr>
+                </a:tc>
+                <a:tc>
+                  <a:txBody>
+                    <a:bodyPr/>
+                    <a:lstStyle/>
+                    <a:p>
+                      <a:pPr algn="r" fontAlgn="b"/>
+                      <a:r>
+                        <a:rPr lang="fi-FI" sz="2400" b="0" i="0" u="none" strike="noStrike">
+                          <a:solidFill>
+                            <a:srgbClr val="000000"/>
+                          </a:solidFill>
+                          <a:effectLst/>
+                          <a:latin typeface="Helvetica Neue Light"/>
+                        </a:rPr>
+                        <a:t> 596,371,762 </a:t>
+                      </a:r>
+                    </a:p>
+                  </a:txBody>
+                  <a:tcPr marL="12700" marR="12700" marT="12700" marB="0" anchor="b">
+                    <a:lnL>
+                      <a:noFill/>
+                    </a:lnL>
+                    <a:lnR>
+                      <a:noFill/>
+                    </a:lnR>
+                    <a:lnT w="6350" cap="flat" cmpd="sng" algn="ctr">
+                      <a:solidFill>
+                        <a:srgbClr val="EBF1DE"/>
+                      </a:solidFill>
+                      <a:prstDash val="solid"/>
+                      <a:round/>
+                      <a:headEnd type="none" w="med" len="med"/>
+                      <a:tailEnd type="none" w="med" len="med"/>
+                    </a:lnT>
+                    <a:lnB w="6350" cap="flat" cmpd="sng" algn="ctr">
+                      <a:solidFill>
+                        <a:srgbClr val="EBF1DE"/>
+                      </a:solidFill>
+                      <a:prstDash val="solid"/>
+                      <a:round/>
+                      <a:headEnd type="none" w="med" len="med"/>
+                      <a:tailEnd type="none" w="med" len="med"/>
+                    </a:lnB>
+                  </a:tcPr>
+                </a:tc>
+              </a:tr>
+              <a:tr h="426244">
+                <a:tc>
+                  <a:txBody>
+                    <a:bodyPr/>
+                    <a:lstStyle/>
+                    <a:p>
+                      <a:pPr algn="l" fontAlgn="b"/>
+                      <a:r>
+                        <a:rPr lang="en-US" sz="2400" b="0" i="0" u="none" strike="noStrike">
+                          <a:solidFill>
+                            <a:srgbClr val="000000"/>
+                          </a:solidFill>
+                          <a:effectLst/>
+                          <a:latin typeface="Helvetica Neue Light"/>
+                        </a:rPr>
+                        <a:t>Northern Cape</a:t>
+                      </a:r>
+                    </a:p>
+                  </a:txBody>
+                  <a:tcPr marL="12700" marR="12700" marT="12700" marB="0" anchor="b">
+                    <a:lnL>
+                      <a:noFill/>
+                    </a:lnL>
+                    <a:lnR>
+                      <a:noFill/>
+                    </a:lnR>
+                    <a:lnT w="6350" cap="flat" cmpd="sng" algn="ctr">
+                      <a:solidFill>
+                        <a:srgbClr val="EBF1DE"/>
+                      </a:solidFill>
+                      <a:prstDash val="solid"/>
+                      <a:round/>
+                      <a:headEnd type="none" w="med" len="med"/>
+                      <a:tailEnd type="none" w="med" len="med"/>
+                    </a:lnT>
+                    <a:lnB w="6350" cap="flat" cmpd="sng" algn="ctr">
+                      <a:solidFill>
+                        <a:srgbClr val="EBF1DE"/>
+                      </a:solidFill>
+                      <a:prstDash val="solid"/>
+                      <a:round/>
+                      <a:headEnd type="none" w="med" len="med"/>
+                      <a:tailEnd type="none" w="med" len="med"/>
+                    </a:lnB>
+                  </a:tcPr>
+                </a:tc>
+                <a:tc>
+                  <a:txBody>
+                    <a:bodyPr/>
+                    <a:lstStyle/>
+                    <a:p>
+                      <a:pPr algn="r" fontAlgn="b"/>
+                      <a:r>
+                        <a:rPr lang="uk-UA" sz="2400" b="0" i="0" u="none" strike="noStrike">
+                          <a:solidFill>
+                            <a:srgbClr val="000000"/>
+                          </a:solidFill>
+                          <a:effectLst/>
+                          <a:latin typeface="Helvetica Neue Light"/>
+                        </a:rPr>
+                        <a:t> 177,314 </a:t>
+                      </a:r>
+                    </a:p>
+                  </a:txBody>
+                  <a:tcPr marL="12700" marR="12700" marT="12700" marB="0" anchor="b">
+                    <a:lnL>
+                      <a:noFill/>
+                    </a:lnL>
+                    <a:lnR>
+                      <a:noFill/>
+                    </a:lnR>
+                    <a:lnT w="6350" cap="flat" cmpd="sng" algn="ctr">
+                      <a:solidFill>
+                        <a:srgbClr val="EBF1DE"/>
+                      </a:solidFill>
+                      <a:prstDash val="solid"/>
+                      <a:round/>
+                      <a:headEnd type="none" w="med" len="med"/>
+                      <a:tailEnd type="none" w="med" len="med"/>
+                    </a:lnT>
+                    <a:lnB w="6350" cap="flat" cmpd="sng" algn="ctr">
+                      <a:solidFill>
+                        <a:srgbClr val="EBF1DE"/>
+                      </a:solidFill>
+                      <a:prstDash val="solid"/>
+                      <a:round/>
+                      <a:headEnd type="none" w="med" len="med"/>
+                      <a:tailEnd type="none" w="med" len="med"/>
+                    </a:lnB>
+                  </a:tcPr>
+                </a:tc>
+                <a:tc>
+                  <a:txBody>
+                    <a:bodyPr/>
+                    <a:lstStyle/>
+                    <a:p>
+                      <a:pPr algn="r" fontAlgn="b"/>
+                      <a:r>
+                        <a:rPr lang="fi-FI" sz="2400" b="0" i="0" u="none" strike="noStrike">
+                          <a:solidFill>
+                            <a:srgbClr val="000000"/>
+                          </a:solidFill>
+                          <a:effectLst/>
+                          <a:latin typeface="Helvetica Neue Light"/>
+                        </a:rPr>
+                        <a:t> 234,940,381 </a:t>
+                      </a:r>
+                    </a:p>
+                  </a:txBody>
+                  <a:tcPr marL="12700" marR="12700" marT="12700" marB="0" anchor="b">
+                    <a:lnL>
+                      <a:noFill/>
+                    </a:lnL>
+                    <a:lnR>
+                      <a:noFill/>
+                    </a:lnR>
+                    <a:lnT w="6350" cap="flat" cmpd="sng" algn="ctr">
+                      <a:solidFill>
+                        <a:srgbClr val="EBF1DE"/>
+                      </a:solidFill>
+                      <a:prstDash val="solid"/>
+                      <a:round/>
+                      <a:headEnd type="none" w="med" len="med"/>
+                      <a:tailEnd type="none" w="med" len="med"/>
+                    </a:lnT>
+                    <a:lnB w="6350" cap="flat" cmpd="sng" algn="ctr">
+                      <a:solidFill>
+                        <a:srgbClr val="EBF1DE"/>
+                      </a:solidFill>
+                      <a:prstDash val="solid"/>
+                      <a:round/>
+                      <a:headEnd type="none" w="med" len="med"/>
+                      <a:tailEnd type="none" w="med" len="med"/>
+                    </a:lnB>
+                  </a:tcPr>
+                </a:tc>
+              </a:tr>
+              <a:tr h="426244">
+                <a:tc>
+                  <a:txBody>
+                    <a:bodyPr/>
+                    <a:lstStyle/>
+                    <a:p>
+                      <a:pPr algn="l" fontAlgn="b"/>
+                      <a:r>
+                        <a:rPr lang="en-US" sz="2400" b="0" i="0" u="none" strike="noStrike">
+                          <a:solidFill>
+                            <a:srgbClr val="000000"/>
+                          </a:solidFill>
+                          <a:effectLst/>
+                          <a:latin typeface="Helvetica Neue Light"/>
+                        </a:rPr>
+                        <a:t>Western Cape</a:t>
+                      </a:r>
+                    </a:p>
+                  </a:txBody>
+                  <a:tcPr marL="12700" marR="12700" marT="12700" marB="0" anchor="b">
+                    <a:lnL>
+                      <a:noFill/>
+                    </a:lnL>
+                    <a:lnR>
+                      <a:noFill/>
+                    </a:lnR>
+                    <a:lnT w="6350" cap="flat" cmpd="sng" algn="ctr">
+                      <a:solidFill>
+                        <a:srgbClr val="EBF1DE"/>
+                      </a:solidFill>
+                      <a:prstDash val="solid"/>
+                      <a:round/>
+                      <a:headEnd type="none" w="med" len="med"/>
+                      <a:tailEnd type="none" w="med" len="med"/>
+                    </a:lnT>
+                    <a:lnB w="25400" cap="flat" cmpd="dbl" algn="ctr">
+                      <a:solidFill>
+                        <a:srgbClr val="76933C"/>
+                      </a:solidFill>
+                      <a:prstDash val="solid"/>
+                      <a:round/>
+                      <a:headEnd type="none" w="med" len="med"/>
+                      <a:tailEnd type="none" w="med" len="med"/>
+                    </a:lnB>
+                  </a:tcPr>
+                </a:tc>
+                <a:tc>
+                  <a:txBody>
+                    <a:bodyPr/>
+                    <a:lstStyle/>
+                    <a:p>
+                      <a:pPr algn="r" fontAlgn="b"/>
+                      <a:r>
+                        <a:rPr lang="fi-FI" sz="2400" b="0" i="0" u="none" strike="noStrike">
+                          <a:solidFill>
+                            <a:srgbClr val="000000"/>
+                          </a:solidFill>
+                          <a:effectLst/>
+                          <a:latin typeface="Helvetica Neue Light"/>
+                        </a:rPr>
+                        <a:t> 53,957 </a:t>
+                      </a:r>
+                    </a:p>
+                  </a:txBody>
+                  <a:tcPr marL="12700" marR="12700" marT="12700" marB="0" anchor="b">
+                    <a:lnL>
+                      <a:noFill/>
+                    </a:lnL>
+                    <a:lnR>
+                      <a:noFill/>
+                    </a:lnR>
+                    <a:lnT w="6350" cap="flat" cmpd="sng" algn="ctr">
+                      <a:solidFill>
+                        <a:srgbClr val="EBF1DE"/>
+                      </a:solidFill>
+                      <a:prstDash val="solid"/>
+                      <a:round/>
+                      <a:headEnd type="none" w="med" len="med"/>
+                      <a:tailEnd type="none" w="med" len="med"/>
+                    </a:lnT>
+                    <a:lnB w="25400" cap="flat" cmpd="dbl" algn="ctr">
+                      <a:solidFill>
+                        <a:srgbClr val="76933C"/>
+                      </a:solidFill>
+                      <a:prstDash val="solid"/>
+                      <a:round/>
+                      <a:headEnd type="none" w="med" len="med"/>
+                      <a:tailEnd type="none" w="med" len="med"/>
+                    </a:lnB>
+                  </a:tcPr>
+                </a:tc>
+                <a:tc>
+                  <a:txBody>
+                    <a:bodyPr/>
+                    <a:lstStyle/>
+                    <a:p>
+                      <a:pPr algn="r" fontAlgn="b"/>
+                      <a:r>
+                        <a:rPr lang="fi-FI" sz="2400" b="0" i="0" u="none" strike="noStrike">
+                          <a:solidFill>
+                            <a:srgbClr val="000000"/>
+                          </a:solidFill>
+                          <a:effectLst/>
+                          <a:latin typeface="Helvetica Neue Light"/>
+                        </a:rPr>
+                        <a:t> 51,460,699 </a:t>
+                      </a:r>
+                    </a:p>
+                  </a:txBody>
+                  <a:tcPr marL="12700" marR="12700" marT="12700" marB="0" anchor="b">
+                    <a:lnL>
+                      <a:noFill/>
+                    </a:lnL>
+                    <a:lnR>
+                      <a:noFill/>
+                    </a:lnR>
+                    <a:lnT w="6350" cap="flat" cmpd="sng" algn="ctr">
+                      <a:solidFill>
+                        <a:srgbClr val="EBF1DE"/>
+                      </a:solidFill>
+                      <a:prstDash val="solid"/>
+                      <a:round/>
+                      <a:headEnd type="none" w="med" len="med"/>
+                      <a:tailEnd type="none" w="med" len="med"/>
+                    </a:lnT>
+                    <a:lnB w="25400" cap="flat" cmpd="dbl" algn="ctr">
+                      <a:solidFill>
+                        <a:srgbClr val="76933C"/>
+                      </a:solidFill>
+                      <a:prstDash val="solid"/>
+                      <a:round/>
+                      <a:headEnd type="none" w="med" len="med"/>
+                      <a:tailEnd type="none" w="med" len="med"/>
+                    </a:lnB>
+                  </a:tcPr>
+                </a:tc>
+              </a:tr>
+              <a:tr h="426244">
+                <a:tc>
+                  <a:txBody>
+                    <a:bodyPr/>
+                    <a:lstStyle/>
+                    <a:p>
+                      <a:pPr algn="l" fontAlgn="b"/>
+                      <a:r>
+                        <a:rPr lang="en-US" sz="2400" b="1" i="0" u="none" strike="noStrike">
+                          <a:solidFill>
+                            <a:srgbClr val="000000"/>
+                          </a:solidFill>
+                          <a:effectLst/>
+                          <a:latin typeface="Helvetica Neue Light"/>
+                        </a:rPr>
+                        <a:t>Grand Total</a:t>
+                      </a:r>
+                    </a:p>
+                  </a:txBody>
+                  <a:tcPr marL="12700" marR="12700" marT="12700" marB="0" anchor="b">
+                    <a:lnL>
+                      <a:noFill/>
+                    </a:lnL>
+                    <a:lnR>
+                      <a:noFill/>
+                    </a:lnR>
+                    <a:lnT w="25400" cap="flat" cmpd="dbl" algn="ctr">
+                      <a:solidFill>
+                        <a:srgbClr val="76933C"/>
+                      </a:solidFill>
+                      <a:prstDash val="solid"/>
+                      <a:round/>
+                      <a:headEnd type="none" w="med" len="med"/>
+                      <a:tailEnd type="none" w="med" len="med"/>
+                    </a:lnT>
+                    <a:lnB>
+                      <a:noFill/>
+                    </a:lnB>
+                  </a:tcPr>
+                </a:tc>
+                <a:tc>
+                  <a:txBody>
+                    <a:bodyPr/>
+                    <a:lstStyle/>
+                    <a:p>
+                      <a:pPr algn="r" fontAlgn="b"/>
+                      <a:r>
+                        <a:rPr lang="cs-CZ" sz="2400" b="1" i="0" u="none" strike="noStrike">
+                          <a:solidFill>
+                            <a:srgbClr val="000000"/>
+                          </a:solidFill>
+                          <a:effectLst/>
+                          <a:latin typeface="Helvetica Neue Light"/>
+                        </a:rPr>
+                        <a:t> 3,539,642 </a:t>
+                      </a:r>
+                    </a:p>
+                  </a:txBody>
+                  <a:tcPr marL="12700" marR="12700" marT="12700" marB="0" anchor="b">
+                    <a:lnL>
+                      <a:noFill/>
+                    </a:lnL>
+                    <a:lnR>
+                      <a:noFill/>
+                    </a:lnR>
+                    <a:lnT w="25400" cap="flat" cmpd="dbl" algn="ctr">
+                      <a:solidFill>
+                        <a:srgbClr val="76933C"/>
+                      </a:solidFill>
+                      <a:prstDash val="solid"/>
+                      <a:round/>
+                      <a:headEnd type="none" w="med" len="med"/>
+                      <a:tailEnd type="none" w="med" len="med"/>
+                    </a:lnT>
+                    <a:lnB>
+                      <a:noFill/>
+                    </a:lnB>
+                  </a:tcPr>
+                </a:tc>
+                <a:tc>
+                  <a:txBody>
+                    <a:bodyPr/>
+                    <a:lstStyle/>
+                    <a:p>
+                      <a:pPr algn="r" fontAlgn="b"/>
+                      <a:r>
+                        <a:rPr lang="fi-FI" sz="2400" b="1" i="0" u="none" strike="noStrike" dirty="0">
+                          <a:solidFill>
+                            <a:srgbClr val="000000"/>
+                          </a:solidFill>
+                          <a:effectLst/>
+                          <a:latin typeface="Helvetica Neue Light"/>
+                        </a:rPr>
+                        <a:t> 6,413,910,824 </a:t>
+                      </a:r>
+                    </a:p>
+                  </a:txBody>
+                  <a:tcPr marL="12700" marR="12700" marT="12700" marB="0" anchor="b">
+                    <a:lnL>
+                      <a:noFill/>
+                    </a:lnL>
+                    <a:lnR>
+                      <a:noFill/>
+                    </a:lnR>
+                    <a:lnT w="25400" cap="flat" cmpd="dbl" algn="ctr">
+                      <a:solidFill>
+                        <a:srgbClr val="76933C"/>
+                      </a:solidFill>
+                      <a:prstDash val="solid"/>
+                      <a:round/>
+                      <a:headEnd type="none" w="med" len="med"/>
+                      <a:tailEnd type="none" w="med" len="med"/>
+                    </a:lnT>
+                    <a:lnB>
+                      <a:noFill/>
+                    </a:lnB>
+                  </a:tcPr>
+                </a:tc>
+              </a:tr>
+            </a:tbl>
+          </a:graphicData>
+        </a:graphic>
+      </p:graphicFrame>
     </p:spTree>
     <p:extLst>
       <p:ext uri="{BB962C8B-B14F-4D97-AF65-F5344CB8AC3E}">

</xml_diff>